<commit_message>
Update PYTHON_1_Fundamentals of Python.pptx
</commit_message>
<xml_diff>
--- a/PYTHON_1_Fundamentals of Python.pptx
+++ b/PYTHON_1_Fundamentals of Python.pptx
@@ -259,7 +259,7 @@
           <a:p>
             <a:fld id="{63DF1F62-B0BA-4F94-8560-CEAFCD29F472}" type="datetimeFigureOut">
               <a:rPr lang="en-US" smtClean="0"/>
-              <a:t>6/24/2019</a:t>
+              <a:t>6/25/2019</a:t>
             </a:fld>
             <a:endParaRPr lang="en-US"/>
           </a:p>
@@ -429,7 +429,7 @@
           <a:p>
             <a:fld id="{63DF1F62-B0BA-4F94-8560-CEAFCD29F472}" type="datetimeFigureOut">
               <a:rPr lang="en-US" smtClean="0"/>
-              <a:t>6/24/2019</a:t>
+              <a:t>6/25/2019</a:t>
             </a:fld>
             <a:endParaRPr lang="en-US"/>
           </a:p>
@@ -609,7 +609,7 @@
           <a:p>
             <a:fld id="{63DF1F62-B0BA-4F94-8560-CEAFCD29F472}" type="datetimeFigureOut">
               <a:rPr lang="en-US" smtClean="0"/>
-              <a:t>6/24/2019</a:t>
+              <a:t>6/25/2019</a:t>
             </a:fld>
             <a:endParaRPr lang="en-US"/>
           </a:p>
@@ -779,7 +779,7 @@
           <a:p>
             <a:fld id="{63DF1F62-B0BA-4F94-8560-CEAFCD29F472}" type="datetimeFigureOut">
               <a:rPr lang="en-US" smtClean="0"/>
-              <a:t>6/24/2019</a:t>
+              <a:t>6/25/2019</a:t>
             </a:fld>
             <a:endParaRPr lang="en-US"/>
           </a:p>
@@ -1025,7 +1025,7 @@
           <a:p>
             <a:fld id="{63DF1F62-B0BA-4F94-8560-CEAFCD29F472}" type="datetimeFigureOut">
               <a:rPr lang="en-US" smtClean="0"/>
-              <a:t>6/24/2019</a:t>
+              <a:t>6/25/2019</a:t>
             </a:fld>
             <a:endParaRPr lang="en-US"/>
           </a:p>
@@ -1257,7 +1257,7 @@
           <a:p>
             <a:fld id="{63DF1F62-B0BA-4F94-8560-CEAFCD29F472}" type="datetimeFigureOut">
               <a:rPr lang="en-US" smtClean="0"/>
-              <a:t>6/24/2019</a:t>
+              <a:t>6/25/2019</a:t>
             </a:fld>
             <a:endParaRPr lang="en-US"/>
           </a:p>
@@ -1624,7 +1624,7 @@
           <a:p>
             <a:fld id="{63DF1F62-B0BA-4F94-8560-CEAFCD29F472}" type="datetimeFigureOut">
               <a:rPr lang="en-US" smtClean="0"/>
-              <a:t>6/24/2019</a:t>
+              <a:t>6/25/2019</a:t>
             </a:fld>
             <a:endParaRPr lang="en-US"/>
           </a:p>
@@ -1742,7 +1742,7 @@
           <a:p>
             <a:fld id="{63DF1F62-B0BA-4F94-8560-CEAFCD29F472}" type="datetimeFigureOut">
               <a:rPr lang="en-US" smtClean="0"/>
-              <a:t>6/24/2019</a:t>
+              <a:t>6/25/2019</a:t>
             </a:fld>
             <a:endParaRPr lang="en-US"/>
           </a:p>
@@ -1837,7 +1837,7 @@
           <a:p>
             <a:fld id="{63DF1F62-B0BA-4F94-8560-CEAFCD29F472}" type="datetimeFigureOut">
               <a:rPr lang="en-US" smtClean="0"/>
-              <a:t>6/24/2019</a:t>
+              <a:t>6/25/2019</a:t>
             </a:fld>
             <a:endParaRPr lang="en-US"/>
           </a:p>
@@ -2114,7 +2114,7 @@
           <a:p>
             <a:fld id="{63DF1F62-B0BA-4F94-8560-CEAFCD29F472}" type="datetimeFigureOut">
               <a:rPr lang="en-US" smtClean="0"/>
-              <a:t>6/24/2019</a:t>
+              <a:t>6/25/2019</a:t>
             </a:fld>
             <a:endParaRPr lang="en-US"/>
           </a:p>
@@ -2371,7 +2371,7 @@
           <a:p>
             <a:fld id="{63DF1F62-B0BA-4F94-8560-CEAFCD29F472}" type="datetimeFigureOut">
               <a:rPr lang="en-US" smtClean="0"/>
-              <a:t>6/24/2019</a:t>
+              <a:t>6/25/2019</a:t>
             </a:fld>
             <a:endParaRPr lang="en-US"/>
           </a:p>
@@ -2587,7 +2587,7 @@
           <a:p>
             <a:fld id="{63DF1F62-B0BA-4F94-8560-CEAFCD29F472}" type="datetimeFigureOut">
               <a:rPr lang="en-US" smtClean="0"/>
-              <a:t>6/24/2019</a:t>
+              <a:t>6/25/2019</a:t>
             </a:fld>
             <a:endParaRPr lang="en-US"/>
           </a:p>
@@ -5244,14 +5244,14 @@
             <p:ph idx="1"/>
             <p:extLst>
               <p:ext uri="{D42A27DB-BD31-4B8C-83A1-F6EECF244321}">
-                <p14:modId xmlns:p14="http://schemas.microsoft.com/office/powerpoint/2010/main" val="2008074489"/>
+                <p14:modId xmlns:p14="http://schemas.microsoft.com/office/powerpoint/2010/main" val="1240172998"/>
               </p:ext>
             </p:extLst>
           </p:nvPr>
         </p:nvGraphicFramePr>
         <p:xfrm>
           <a:off x="838200" y="1825625"/>
-          <a:ext cx="10515600" cy="4316740"/>
+          <a:ext cx="10515600" cy="4082808"/>
         </p:xfrm>
         <a:graphic>
           <a:graphicData uri="http://schemas.openxmlformats.org/drawingml/2006/table">
@@ -5354,13 +5354,7 @@
                     <a:p>
                       <a:r>
                         <a:rPr lang="en-US" dirty="0"/>
-                        <a:t>Jun 25, 26, 27</a:t>
-                      </a:r>
-                    </a:p>
-                    <a:p>
-                      <a:r>
-                        <a:rPr lang="en-US" dirty="0"/>
-                        <a:t>Jul 1, 2, 3, 4, 8, 9, 10, 11, 15, 16, 17, 18, 22, 23, 24</a:t>
+                        <a:t>-</a:t>
                       </a:r>
                     </a:p>
                   </a:txBody>
@@ -5373,7 +5367,7 @@
                     <a:p>
                       <a:r>
                         <a:rPr lang="en-US" dirty="0"/>
-                        <a:t>10</a:t>
+                        <a:t>Later depending on syllabus and time </a:t>
                       </a:r>
                     </a:p>
                   </a:txBody>
@@ -5406,19 +5400,7 @@
                     <a:p>
                       <a:r>
                         <a:rPr lang="en-US" dirty="0"/>
-                        <a:t>June 28, Jul 5, Jul 12, Jul 19 (</a:t>
-                      </a:r>
-                      <a:r>
-                        <a:rPr lang="en-US" dirty="0">
-                          <a:solidFill>
-                            <a:srgbClr val="FF0000"/>
-                          </a:solidFill>
-                        </a:rPr>
-                        <a:t>May Change</a:t>
-                      </a:r>
-                      <a:r>
-                        <a:rPr lang="en-US" dirty="0"/>
-                        <a:t>)</a:t>
+                        <a:t>Based on time availability </a:t>
                       </a:r>
                     </a:p>
                   </a:txBody>
@@ -5431,7 +5413,7 @@
                     <a:p>
                       <a:r>
                         <a:rPr lang="en-US" dirty="0"/>
-                        <a:t>10</a:t>
+                        <a:t>20</a:t>
                       </a:r>
                     </a:p>
                   </a:txBody>
@@ -5510,7 +5492,7 @@
                     <a:p>
                       <a:r>
                         <a:rPr lang="en-US" dirty="0"/>
-                        <a:t>July 25</a:t>
+                        <a:t>July 24</a:t>
                       </a:r>
                     </a:p>
                   </a:txBody>
@@ -5556,7 +5538,7 @@
                     <a:p>
                       <a:r>
                         <a:rPr lang="en-US" dirty="0"/>
-                        <a:t>July 9, July 16, July 23</a:t>
+                        <a:t>July 9, July 16, July 22</a:t>
                       </a:r>
                     </a:p>
                   </a:txBody>

</xml_diff>